<commit_message>
add performance tests, refactor TicTacToeGame
</commit_message>
<xml_diff>
--- a/bridge.net/bridge-net.pptx
+++ b/bridge.net/bridge-net.pptx
@@ -8,17 +8,19 @@
     <p:sldId id="256" r:id="rId2"/>
     <p:sldId id="264" r:id="rId3"/>
     <p:sldId id="258" r:id="rId4"/>
-    <p:sldId id="263" r:id="rId5"/>
-    <p:sldId id="266" r:id="rId6"/>
-    <p:sldId id="262" r:id="rId7"/>
-    <p:sldId id="261" r:id="rId8"/>
-    <p:sldId id="265" r:id="rId9"/>
-    <p:sldId id="269" r:id="rId10"/>
-    <p:sldId id="267" r:id="rId11"/>
-    <p:sldId id="270" r:id="rId12"/>
-    <p:sldId id="268" r:id="rId13"/>
-    <p:sldId id="271" r:id="rId14"/>
-    <p:sldId id="272" r:id="rId15"/>
+    <p:sldId id="273" r:id="rId5"/>
+    <p:sldId id="261" r:id="rId6"/>
+    <p:sldId id="274" r:id="rId7"/>
+    <p:sldId id="262" r:id="rId8"/>
+    <p:sldId id="263" r:id="rId9"/>
+    <p:sldId id="266" r:id="rId10"/>
+    <p:sldId id="265" r:id="rId11"/>
+    <p:sldId id="269" r:id="rId12"/>
+    <p:sldId id="267" r:id="rId13"/>
+    <p:sldId id="270" r:id="rId14"/>
+    <p:sldId id="268" r:id="rId15"/>
+    <p:sldId id="271" r:id="rId16"/>
+    <p:sldId id="272" r:id="rId17"/>
   </p:sldIdLst>
   <p:sldSz cx="12192000" cy="6858000"/>
   <p:notesSz cx="6858000" cy="9144000"/>
@@ -351,7 +353,7 @@
           <a:p>
             <a:fld id="{96DFF08F-DC6B-4601-B491-B0F83F6DD2DA}" type="datetimeFigureOut">
               <a:rPr lang="en-US" dirty="0"/>
-              <a:t>5/2/2019</a:t>
+              <a:t>5/6/2019</a:t>
             </a:fld>
             <a:endParaRPr lang="en-US" dirty="0"/>
           </a:p>
@@ -554,7 +556,7 @@
           <a:p>
             <a:fld id="{96DFF08F-DC6B-4601-B491-B0F83F6DD2DA}" type="datetimeFigureOut">
               <a:rPr lang="en-US" dirty="0"/>
-              <a:t>5/2/2019</a:t>
+              <a:t>5/6/2019</a:t>
             </a:fld>
             <a:endParaRPr lang="en-US" dirty="0"/>
           </a:p>
@@ -805,7 +807,7 @@
           <a:p>
             <a:fld id="{96DFF08F-DC6B-4601-B491-B0F83F6DD2DA}" type="datetimeFigureOut">
               <a:rPr lang="en-US" dirty="0"/>
-              <a:t>5/2/2019</a:t>
+              <a:t>5/6/2019</a:t>
             </a:fld>
             <a:endParaRPr lang="en-US" dirty="0"/>
           </a:p>
@@ -970,7 +972,7 @@
           <a:p>
             <a:fld id="{D62CEF3B-A037-46D0-B02C-1428F07E9383}" type="datetimeFigureOut">
               <a:rPr lang="en-US" dirty="0"/>
-              <a:t>5/2/2019</a:t>
+              <a:t>5/6/2019</a:t>
             </a:fld>
             <a:endParaRPr lang="en-US" dirty="0"/>
           </a:p>
@@ -1308,7 +1310,7 @@
           <a:p>
             <a:fld id="{96DFF08F-DC6B-4601-B491-B0F83F6DD2DA}" type="datetimeFigureOut">
               <a:rPr lang="en-US" dirty="0"/>
-              <a:t>5/2/2019</a:t>
+              <a:t>5/6/2019</a:t>
             </a:fld>
             <a:endParaRPr lang="en-US" dirty="0"/>
           </a:p>
@@ -1578,7 +1580,7 @@
           <a:p>
             <a:fld id="{96DFF08F-DC6B-4601-B491-B0F83F6DD2DA}" type="datetimeFigureOut">
               <a:rPr lang="en-US" dirty="0"/>
-              <a:t>5/2/2019</a:t>
+              <a:t>5/6/2019</a:t>
             </a:fld>
             <a:endParaRPr lang="en-US" dirty="0"/>
           </a:p>
@@ -1952,7 +1954,7 @@
           <a:p>
             <a:fld id="{96DFF08F-DC6B-4601-B491-B0F83F6DD2DA}" type="datetimeFigureOut">
               <a:rPr lang="en-US" dirty="0"/>
-              <a:t>5/2/2019</a:t>
+              <a:t>5/6/2019</a:t>
             </a:fld>
             <a:endParaRPr lang="en-US" dirty="0"/>
           </a:p>
@@ -2065,7 +2067,7 @@
           <a:p>
             <a:fld id="{96DFF08F-DC6B-4601-B491-B0F83F6DD2DA}" type="datetimeFigureOut">
               <a:rPr lang="en-US" dirty="0"/>
-              <a:t>5/2/2019</a:t>
+              <a:t>5/6/2019</a:t>
             </a:fld>
             <a:endParaRPr lang="en-US" dirty="0"/>
           </a:p>
@@ -2232,7 +2234,7 @@
             <a:fld id="{96DFF08F-DC6B-4601-B491-B0F83F6DD2DA}" type="datetimeFigureOut">
               <a:rPr lang="en-US" dirty="0"/>
               <a:pPr/>
-              <a:t>5/2/2019</a:t>
+              <a:t>5/6/2019</a:t>
             </a:fld>
             <a:endParaRPr lang="en-US" dirty="0"/>
           </a:p>
@@ -2583,7 +2585,7 @@
             <a:fld id="{96DFF08F-DC6B-4601-B491-B0F83F6DD2DA}" type="datetimeFigureOut">
               <a:rPr lang="en-US" dirty="0"/>
               <a:pPr/>
-              <a:t>5/2/2019</a:t>
+              <a:t>5/6/2019</a:t>
             </a:fld>
             <a:endParaRPr lang="en-US" dirty="0"/>
           </a:p>
@@ -2956,7 +2958,7 @@
           <a:p>
             <a:fld id="{96DFF08F-DC6B-4601-B491-B0F83F6DD2DA}" type="datetimeFigureOut">
               <a:rPr lang="en-US" dirty="0"/>
-              <a:t>5/2/2019</a:t>
+              <a:t>5/6/2019</a:t>
             </a:fld>
             <a:endParaRPr lang="en-US" dirty="0"/>
           </a:p>
@@ -3239,7 +3241,7 @@
             <a:fld id="{96DFF08F-DC6B-4601-B491-B0F83F6DD2DA}" type="datetimeFigureOut">
               <a:rPr lang="en-US" dirty="0"/>
               <a:pPr/>
-              <a:t>5/2/2019</a:t>
+              <a:t>5/6/2019</a:t>
             </a:fld>
             <a:endParaRPr lang="en-US" dirty="0"/>
           </a:p>
@@ -3978,7 +3980,15 @@
           <a:p>
             <a:r>
               <a:rPr lang="en-US" dirty="0"/>
-              <a:t>Use Case: Client Side Scripting (MVC)</a:t>
+              <a:t>Use Case: </a:t>
+            </a:r>
+            <a:r>
+              <a:rPr lang="en-US" dirty="0" err="1"/>
+              <a:t>Transpiling</a:t>
+            </a:r>
+            <a:r>
+              <a:rPr lang="en-US" dirty="0"/>
+              <a:t> Business Logic</a:t>
             </a:r>
           </a:p>
         </p:txBody>
@@ -4010,15 +4020,7 @@
             </a:pPr>
             <a:r>
               <a:rPr lang="en-US" dirty="0"/>
-              <a:t> PRO: Use everything you love about .NET (</a:t>
-            </a:r>
-            <a:r>
-              <a:rPr lang="en-US" dirty="0" err="1"/>
-              <a:t>Linq</a:t>
-            </a:r>
-            <a:r>
-              <a:rPr lang="en-US" dirty="0"/>
-              <a:t>, decimals, sane OOP)</a:t>
+              <a:t> PRO: Business logic is equivalent without any extra work</a:t>
             </a:r>
           </a:p>
           <a:p>
@@ -4028,7 +4030,23 @@
             </a:pPr>
             <a:r>
               <a:rPr lang="en-US" dirty="0"/>
-              <a:t> CON: Leaky abstraction – still need to know browser idioms, frameworks</a:t>
+              <a:t> CON: Interop between </a:t>
+            </a:r>
+            <a:r>
+              <a:rPr lang="en-US" dirty="0" err="1"/>
+              <a:t>Javascript</a:t>
+            </a:r>
+            <a:r>
+              <a:rPr lang="en-US" dirty="0"/>
+              <a:t> and </a:t>
+            </a:r>
+            <a:r>
+              <a:rPr lang="en-US" dirty="0" err="1"/>
+              <a:t>transpiled</a:t>
+            </a:r>
+            <a:r>
+              <a:rPr lang="en-US" dirty="0"/>
+              <a:t> code can be nasty, especially with generics</a:t>
             </a:r>
           </a:p>
         </p:txBody>
@@ -4036,7 +4054,7 @@
     </p:spTree>
     <p:extLst>
       <p:ext uri="{BB962C8B-B14F-4D97-AF65-F5344CB8AC3E}">
-        <p14:creationId xmlns:p14="http://schemas.microsoft.com/office/powerpoint/2010/main" val="3260129901"/>
+        <p14:creationId xmlns:p14="http://schemas.microsoft.com/office/powerpoint/2010/main" val="3936768775"/>
       </p:ext>
     </p:extLst>
   </p:cSld>
@@ -4114,7 +4132,15 @@
           <a:p>
             <a:r>
               <a:rPr lang="en-US" dirty="0"/>
-              <a:t>MVC APP WITH CLIENT SIDE BRIDGE SCRIPTING</a:t>
+              <a:t>Angular spa with </a:t>
+            </a:r>
+            <a:r>
+              <a:rPr lang="en-US" dirty="0" err="1"/>
+              <a:t>transpiled</a:t>
+            </a:r>
+            <a:r>
+              <a:rPr lang="en-US" dirty="0"/>
+              <a:t> business logic</a:t>
             </a:r>
           </a:p>
         </p:txBody>
@@ -4122,7 +4148,7 @@
     </p:spTree>
     <p:extLst>
       <p:ext uri="{BB962C8B-B14F-4D97-AF65-F5344CB8AC3E}">
-        <p14:creationId xmlns:p14="http://schemas.microsoft.com/office/powerpoint/2010/main" val="2451102722"/>
+        <p14:creationId xmlns:p14="http://schemas.microsoft.com/office/powerpoint/2010/main" val="3122916019"/>
       </p:ext>
     </p:extLst>
   </p:cSld>
@@ -4172,7 +4198,7 @@
           <a:p>
             <a:r>
               <a:rPr lang="en-US" dirty="0"/>
-              <a:t>Use Case: Client Side Scripting (SPA)</a:t>
+              <a:t>Use Case: Client Side Scripting (MVC)</a:t>
             </a:r>
           </a:p>
         </p:txBody>
@@ -4204,7 +4230,15 @@
             </a:pPr>
             <a:r>
               <a:rPr lang="en-US" dirty="0"/>
-              <a:t> PRO: Same as MVC – it’s .NET!</a:t>
+              <a:t> PRO: Use everything you love about .NET (</a:t>
+            </a:r>
+            <a:r>
+              <a:rPr lang="en-US" dirty="0" err="1"/>
+              <a:t>Linq</a:t>
+            </a:r>
+            <a:r>
+              <a:rPr lang="en-US" dirty="0"/>
+              <a:t>, decimals, sane OOP)</a:t>
             </a:r>
           </a:p>
           <a:p>
@@ -4214,7 +4248,7 @@
             </a:pPr>
             <a:r>
               <a:rPr lang="en-US" dirty="0"/>
-              <a:t> CON: Depending on the framework you’re using, you may be missing out on additional functionality provided by framework build processes (JSX in react)</a:t>
+              <a:t> CON: Leaky abstraction – still need to know browser idioms, frameworks</a:t>
             </a:r>
           </a:p>
         </p:txBody>
@@ -4222,7 +4256,7 @@
     </p:spTree>
     <p:extLst>
       <p:ext uri="{BB962C8B-B14F-4D97-AF65-F5344CB8AC3E}">
-        <p14:creationId xmlns:p14="http://schemas.microsoft.com/office/powerpoint/2010/main" val="1799532902"/>
+        <p14:creationId xmlns:p14="http://schemas.microsoft.com/office/powerpoint/2010/main" val="3260129901"/>
       </p:ext>
     </p:extLst>
   </p:cSld>
@@ -4295,6 +4329,192 @@
         </p:nvSpPr>
         <p:spPr/>
         <p:txBody>
+          <a:bodyPr/>
+          <a:lstStyle/>
+          <a:p>
+            <a:r>
+              <a:rPr lang="en-US" dirty="0"/>
+              <a:t>MVC APP WITH CLIENT SIDE BRIDGE SCRIPTING</a:t>
+            </a:r>
+          </a:p>
+        </p:txBody>
+      </p:sp>
+    </p:spTree>
+    <p:extLst>
+      <p:ext uri="{BB962C8B-B14F-4D97-AF65-F5344CB8AC3E}">
+        <p14:creationId xmlns:p14="http://schemas.microsoft.com/office/powerpoint/2010/main" val="2451102722"/>
+      </p:ext>
+    </p:extLst>
+  </p:cSld>
+  <p:clrMapOvr>
+    <a:masterClrMapping/>
+  </p:clrMapOvr>
+</p:sld>
+</file>
+
+<file path=ppt/slides/slide14.xml><?xml version="1.0" encoding="utf-8"?>
+<p:sld xmlns:a="http://schemas.openxmlformats.org/drawingml/2006/main" xmlns:r="http://schemas.openxmlformats.org/officeDocument/2006/relationships" xmlns:p="http://schemas.openxmlformats.org/presentationml/2006/main">
+  <p:cSld>
+    <p:spTree>
+      <p:nvGrpSpPr>
+        <p:cNvPr id="1" name=""/>
+        <p:cNvGrpSpPr/>
+        <p:nvPr/>
+      </p:nvGrpSpPr>
+      <p:grpSpPr>
+        <a:xfrm>
+          <a:off x="0" y="0"/>
+          <a:ext cx="0" cy="0"/>
+          <a:chOff x="0" y="0"/>
+          <a:chExt cx="0" cy="0"/>
+        </a:xfrm>
+      </p:grpSpPr>
+      <p:sp>
+        <p:nvSpPr>
+          <p:cNvPr id="2" name="Title 1">
+            <a:extLst>
+              <a:ext uri="{FF2B5EF4-FFF2-40B4-BE49-F238E27FC236}">
+                <a16:creationId xmlns:a16="http://schemas.microsoft.com/office/drawing/2014/main" id="{3828297B-80B3-4E2C-AFCF-A02F37BCFD87}"/>
+              </a:ext>
+            </a:extLst>
+          </p:cNvPr>
+          <p:cNvSpPr>
+            <a:spLocks noGrp="1"/>
+          </p:cNvSpPr>
+          <p:nvPr>
+            <p:ph type="title"/>
+          </p:nvPr>
+        </p:nvSpPr>
+        <p:spPr/>
+        <p:txBody>
+          <a:bodyPr/>
+          <a:lstStyle/>
+          <a:p>
+            <a:r>
+              <a:rPr lang="en-US" dirty="0"/>
+              <a:t>Use Case: Client Side Scripting (SPA)</a:t>
+            </a:r>
+          </a:p>
+        </p:txBody>
+      </p:sp>
+      <p:sp>
+        <p:nvSpPr>
+          <p:cNvPr id="3" name="Content Placeholder 2">
+            <a:extLst>
+              <a:ext uri="{FF2B5EF4-FFF2-40B4-BE49-F238E27FC236}">
+                <a16:creationId xmlns:a16="http://schemas.microsoft.com/office/drawing/2014/main" id="{DE03C8C4-2337-4316-B021-1D5AFB73488A}"/>
+              </a:ext>
+            </a:extLst>
+          </p:cNvPr>
+          <p:cNvSpPr>
+            <a:spLocks noGrp="1"/>
+          </p:cNvSpPr>
+          <p:nvPr>
+            <p:ph idx="1"/>
+          </p:nvPr>
+        </p:nvSpPr>
+        <p:spPr/>
+        <p:txBody>
+          <a:bodyPr/>
+          <a:lstStyle/>
+          <a:p>
+            <a:pPr>
+              <a:buFont typeface="Arial" panose="020B0604020202020204" pitchFamily="34" charset="0"/>
+              <a:buChar char="•"/>
+            </a:pPr>
+            <a:r>
+              <a:rPr lang="en-US" dirty="0"/>
+              <a:t> PRO: Same as MVC – it’s .NET!</a:t>
+            </a:r>
+          </a:p>
+          <a:p>
+            <a:pPr>
+              <a:buFont typeface="Arial" panose="020B0604020202020204" pitchFamily="34" charset="0"/>
+              <a:buChar char="•"/>
+            </a:pPr>
+            <a:r>
+              <a:rPr lang="en-US" dirty="0"/>
+              <a:t> CON: Depending on the framework you’re using, you may be missing out on additional functionality provided by framework build processes (JSX in react)</a:t>
+            </a:r>
+          </a:p>
+        </p:txBody>
+      </p:sp>
+    </p:spTree>
+    <p:extLst>
+      <p:ext uri="{BB962C8B-B14F-4D97-AF65-F5344CB8AC3E}">
+        <p14:creationId xmlns:p14="http://schemas.microsoft.com/office/powerpoint/2010/main" val="1799532902"/>
+      </p:ext>
+    </p:extLst>
+  </p:cSld>
+  <p:clrMapOvr>
+    <a:masterClrMapping/>
+  </p:clrMapOvr>
+</p:sld>
+</file>
+
+<file path=ppt/slides/slide15.xml><?xml version="1.0" encoding="utf-8"?>
+<p:sld xmlns:a="http://schemas.openxmlformats.org/drawingml/2006/main" xmlns:r="http://schemas.openxmlformats.org/officeDocument/2006/relationships" xmlns:p="http://schemas.openxmlformats.org/presentationml/2006/main">
+  <p:cSld>
+    <p:spTree>
+      <p:nvGrpSpPr>
+        <p:cNvPr id="1" name=""/>
+        <p:cNvGrpSpPr/>
+        <p:nvPr/>
+      </p:nvGrpSpPr>
+      <p:grpSpPr>
+        <a:xfrm>
+          <a:off x="0" y="0"/>
+          <a:ext cx="0" cy="0"/>
+          <a:chOff x="0" y="0"/>
+          <a:chExt cx="0" cy="0"/>
+        </a:xfrm>
+      </p:grpSpPr>
+      <p:sp>
+        <p:nvSpPr>
+          <p:cNvPr id="2" name="Title 1">
+            <a:extLst>
+              <a:ext uri="{FF2B5EF4-FFF2-40B4-BE49-F238E27FC236}">
+                <a16:creationId xmlns:a16="http://schemas.microsoft.com/office/drawing/2014/main" id="{4AD4C152-7495-4980-B3A3-5DB6A3FB6705}"/>
+              </a:ext>
+            </a:extLst>
+          </p:cNvPr>
+          <p:cNvSpPr>
+            <a:spLocks noGrp="1"/>
+          </p:cNvSpPr>
+          <p:nvPr>
+            <p:ph type="ctrTitle"/>
+          </p:nvPr>
+        </p:nvSpPr>
+        <p:spPr/>
+        <p:txBody>
+          <a:bodyPr/>
+          <a:lstStyle/>
+          <a:p>
+            <a:r>
+              <a:rPr lang="en-US" dirty="0"/>
+              <a:t>DEMO</a:t>
+            </a:r>
+          </a:p>
+        </p:txBody>
+      </p:sp>
+      <p:sp>
+        <p:nvSpPr>
+          <p:cNvPr id="5" name="Subtitle 4">
+            <a:extLst>
+              <a:ext uri="{FF2B5EF4-FFF2-40B4-BE49-F238E27FC236}">
+                <a16:creationId xmlns:a16="http://schemas.microsoft.com/office/drawing/2014/main" id="{E8D2EE01-206B-4B8F-97F0-3DE8D92389FE}"/>
+              </a:ext>
+            </a:extLst>
+          </p:cNvPr>
+          <p:cNvSpPr>
+            <a:spLocks noGrp="1"/>
+          </p:cNvSpPr>
+          <p:nvPr>
+            <p:ph type="subTitle" idx="1"/>
+          </p:nvPr>
+        </p:nvSpPr>
+        <p:spPr/>
+        <p:txBody>
           <a:bodyPr>
             <a:normAutofit fontScale="92500"/>
           </a:bodyPr>
@@ -4329,7 +4549,7 @@
 </p:sld>
 </file>
 
-<file path=ppt/slides/slide14.xml><?xml version="1.0" encoding="utf-8"?>
+<file path=ppt/slides/slide16.xml><?xml version="1.0" encoding="utf-8"?>
 <p:sld xmlns:a="http://schemas.openxmlformats.org/drawingml/2006/main" xmlns:r="http://schemas.openxmlformats.org/officeDocument/2006/relationships" xmlns:p="http://schemas.openxmlformats.org/presentationml/2006/main">
   <p:cSld>
     <p:spTree>
@@ -4753,7 +4973,9 @@
         </p:nvSpPr>
         <p:spPr/>
         <p:txBody>
-          <a:bodyPr/>
+          <a:bodyPr>
+            <a:normAutofit/>
+          </a:bodyPr>
           <a:lstStyle/>
           <a:p>
             <a:pPr>
@@ -4780,7 +5002,30 @@
             </a:pPr>
             <a:r>
               <a:rPr lang="en-US" dirty="0"/>
-              <a:t> Can plug into both traditional MVC-style websites and SPA frameworks like Angular/React</a:t>
+              <a:t> </a:t>
+            </a:r>
+            <a:r>
+              <a:rPr lang="en-US" dirty="0" err="1"/>
+              <a:t>Transpile</a:t>
+            </a:r>
+            <a:r>
+              <a:rPr lang="en-US" dirty="0"/>
+              <a:t> Business Logic and call from existing </a:t>
+            </a:r>
+            <a:r>
+              <a:rPr lang="en-US" dirty="0" err="1"/>
+              <a:t>Javascript</a:t>
+            </a:r>
+            <a:endParaRPr lang="en-US" dirty="0"/>
+          </a:p>
+          <a:p>
+            <a:pPr lvl="1">
+              <a:buFont typeface="Arial" panose="020B0604020202020204" pitchFamily="34" charset="0"/>
+              <a:buChar char="•"/>
+            </a:pPr>
+            <a:r>
+              <a:rPr lang="en-US" dirty="0"/>
+              <a:t>Works with any project type or framework</a:t>
             </a:r>
           </a:p>
           <a:p>
@@ -4790,41 +5035,53 @@
             </a:pPr>
             <a:r>
               <a:rPr lang="en-US" dirty="0"/>
-              <a:t> Allows client side </a:t>
+              <a:t> Write all front end script in </a:t>
             </a:r>
             <a:r>
               <a:rPr lang="en-US" dirty="0" err="1"/>
               <a:t>Javascript</a:t>
             </a:r>
-            <a:r>
-              <a:rPr lang="en-US" dirty="0"/>
-              <a:t> to be written in .NET</a:t>
-            </a:r>
-          </a:p>
-          <a:p>
-            <a:pPr>
+            <a:endParaRPr lang="en-US" dirty="0"/>
+          </a:p>
+          <a:p>
+            <a:pPr lvl="1">
               <a:buFont typeface="Arial" panose="020B0604020202020204" pitchFamily="34" charset="0"/>
               <a:buChar char="•"/>
             </a:pPr>
             <a:r>
               <a:rPr lang="en-US" dirty="0"/>
-              <a:t> Allows business logic to be translated into </a:t>
-            </a:r>
-            <a:r>
-              <a:rPr lang="en-US" dirty="0" err="1"/>
-              <a:t>Javascript</a:t>
-            </a:r>
-            <a:r>
-              <a:rPr lang="en-US" dirty="0"/>
-              <a:t> instead of writing twice</a:t>
-            </a:r>
-          </a:p>
-          <a:p>
-            <a:pPr>
+              <a:t>Works much better for traditional web apps than SPAs</a:t>
+            </a:r>
+          </a:p>
+          <a:p>
+            <a:pPr lvl="1">
               <a:buFont typeface="Arial" panose="020B0604020202020204" pitchFamily="34" charset="0"/>
               <a:buChar char="•"/>
             </a:pPr>
-            <a:endParaRPr lang="en-US" dirty="0"/>
+            <a:r>
+              <a:rPr lang="en-US" dirty="0"/>
+              <a:t>Newer SPA frameworks have issues:</a:t>
+            </a:r>
+          </a:p>
+          <a:p>
+            <a:pPr lvl="2">
+              <a:buFont typeface="Arial" panose="020B0604020202020204" pitchFamily="34" charset="0"/>
+              <a:buChar char="•"/>
+            </a:pPr>
+            <a:r>
+              <a:rPr lang="en-US" dirty="0"/>
+              <a:t>React works, but JSX isn’t available</a:t>
+            </a:r>
+          </a:p>
+          <a:p>
+            <a:pPr lvl="2">
+              <a:buFont typeface="Arial" panose="020B0604020202020204" pitchFamily="34" charset="0"/>
+              <a:buChar char="•"/>
+            </a:pPr>
+            <a:r>
+              <a:rPr lang="en-US" dirty="0"/>
+              <a:t>Angular just doesn’t work</a:t>
+            </a:r>
           </a:p>
         </p:txBody>
       </p:sp>
@@ -4863,7 +5120,7 @@
           <p:cNvPr id="2" name="Title 1">
             <a:extLst>
               <a:ext uri="{FF2B5EF4-FFF2-40B4-BE49-F238E27FC236}">
-                <a16:creationId xmlns:a16="http://schemas.microsoft.com/office/drawing/2014/main" id="{7091D0E5-1C16-4903-A1E6-83EECDE50ABB}"/>
+                <a16:creationId xmlns:a16="http://schemas.microsoft.com/office/drawing/2014/main" id="{5100D425-1D8B-4C6D-89ED-93B280ACCCCB}"/>
               </a:ext>
             </a:extLst>
           </p:cNvPr>
@@ -4881,7 +5138,15 @@
           <a:p>
             <a:r>
               <a:rPr lang="en-US" dirty="0"/>
-              <a:t>Still not convinced? A Case Study.</a:t>
+              <a:t>You’re writing </a:t>
+            </a:r>
+            <a:r>
+              <a:rPr lang="en-US" dirty="0" err="1"/>
+              <a:t>Javascript</a:t>
+            </a:r>
+            <a:r>
+              <a:rPr lang="en-US" dirty="0"/>
+              <a:t> in C#</a:t>
             </a:r>
           </a:p>
         </p:txBody>
@@ -4891,7 +5156,7 @@
           <p:cNvPr id="3" name="Content Placeholder 2">
             <a:extLst>
               <a:ext uri="{FF2B5EF4-FFF2-40B4-BE49-F238E27FC236}">
-                <a16:creationId xmlns:a16="http://schemas.microsoft.com/office/drawing/2014/main" id="{A0E2B1B0-9E13-49C4-885C-6ABE1A6580AE}"/>
+                <a16:creationId xmlns:a16="http://schemas.microsoft.com/office/drawing/2014/main" id="{AA81EC90-B36E-482B-96C3-32AC4D5691D4}"/>
               </a:ext>
             </a:extLst>
           </p:cNvPr>
@@ -4908,68 +5173,87 @@
           <a:lstStyle/>
           <a:p>
             <a:pPr>
-              <a:buFont typeface="Wingdings" panose="05000000000000000000" pitchFamily="2" charset="2"/>
-              <a:buChar char="§"/>
+              <a:buFont typeface="Arial" panose="020B0604020202020204" pitchFamily="34" charset="0"/>
+              <a:buChar char="•"/>
             </a:pPr>
             <a:r>
               <a:rPr lang="en-US" dirty="0"/>
-              <a:t> </a:t>
+              <a:t> Leaky abstraction for writing client side logic – you’ll do best if you already understand client side programming in </a:t>
             </a:r>
             <a:r>
               <a:rPr lang="en-US" dirty="0" err="1"/>
-              <a:t>Greatland</a:t>
-            </a:r>
-            <a:r>
-              <a:rPr lang="en-US" dirty="0"/>
-              <a:t> Corp: Business tax filing service (1099/w-2)</a:t>
-            </a:r>
+              <a:t>Javascript</a:t>
+            </a:r>
+            <a:endParaRPr lang="en-US" dirty="0"/>
           </a:p>
           <a:p>
             <a:pPr>
-              <a:buFont typeface="Wingdings" panose="05000000000000000000" pitchFamily="2" charset="2"/>
-              <a:buChar char="§"/>
+              <a:buFont typeface="Arial" panose="020B0604020202020204" pitchFamily="34" charset="0"/>
+              <a:buChar char="•"/>
             </a:pPr>
             <a:r>
               <a:rPr lang="en-US" dirty="0"/>
-              <a:t> Traditionally a </a:t>
+              <a:t> Most business logic can be </a:t>
             </a:r>
             <a:r>
               <a:rPr lang="en-US" dirty="0" err="1"/>
-              <a:t>.Net</a:t>
-            </a:r>
-            <a:r>
-              <a:rPr lang="en-US" dirty="0"/>
-              <a:t> shop</a:t>
+              <a:t>transpiled</a:t>
+            </a:r>
+            <a:r>
+              <a:rPr lang="en-US" dirty="0"/>
+              <a:t> as is</a:t>
             </a:r>
           </a:p>
           <a:p>
             <a:pPr>
-              <a:buFont typeface="Wingdings" panose="05000000000000000000" pitchFamily="2" charset="2"/>
-              <a:buChar char="§"/>
+              <a:buFont typeface="Arial" panose="020B0604020202020204" pitchFamily="34" charset="0"/>
+              <a:buChar char="•"/>
             </a:pPr>
             <a:r>
               <a:rPr lang="en-US" dirty="0"/>
-              <a:t> Complicated business logic for form rules</a:t>
-            </a:r>
-          </a:p>
-          <a:p>
-            <a:pPr lvl="1">
-              <a:buFont typeface="Wingdings" panose="05000000000000000000" pitchFamily="2" charset="2"/>
-              <a:buChar char="§"/>
+              <a:t> Don’t have access to .NET libraries in </a:t>
+            </a:r>
+            <a:r>
+              <a:rPr lang="en-US" dirty="0" err="1"/>
+              <a:t>Nuget</a:t>
+            </a:r>
+            <a:r>
+              <a:rPr lang="en-US" dirty="0"/>
+              <a:t>, but you could theoretically </a:t>
+            </a:r>
+            <a:r>
+              <a:rPr lang="en-US" dirty="0" err="1"/>
+              <a:t>transpile</a:t>
+            </a:r>
+            <a:r>
+              <a:rPr lang="en-US" dirty="0"/>
+              <a:t> them</a:t>
+            </a:r>
+          </a:p>
+          <a:p>
+            <a:pPr>
+              <a:buFont typeface="Arial" panose="020B0604020202020204" pitchFamily="34" charset="0"/>
+              <a:buChar char="•"/>
             </a:pPr>
             <a:r>
               <a:rPr lang="en-US" dirty="0"/>
-              <a:t> Immediate validation on client side preferred</a:t>
-            </a:r>
-          </a:p>
-          <a:p>
-            <a:pPr lvl="1">
-              <a:buFont typeface="Wingdings" panose="05000000000000000000" pitchFamily="2" charset="2"/>
-              <a:buChar char="§"/>
-            </a:pPr>
-            <a:r>
-              <a:rPr lang="en-US" dirty="0"/>
-              <a:t> Had issues in the past duplicating client and server side validations</a:t>
+              <a:t> You DO have access to </a:t>
+            </a:r>
+            <a:r>
+              <a:rPr lang="en-US" dirty="0" err="1"/>
+              <a:t>Javascript</a:t>
+            </a:r>
+            <a:r>
+              <a:rPr lang="en-US" dirty="0"/>
+              <a:t> libraries in </a:t>
+            </a:r>
+            <a:r>
+              <a:rPr lang="en-US" dirty="0" err="1"/>
+              <a:t>Nuget</a:t>
+            </a:r>
+            <a:r>
+              <a:rPr lang="en-US" dirty="0"/>
+              <a:t>…</a:t>
             </a:r>
           </a:p>
         </p:txBody>
@@ -4977,7 +5261,7 @@
     </p:spTree>
     <p:extLst>
       <p:ext uri="{BB962C8B-B14F-4D97-AF65-F5344CB8AC3E}">
-        <p14:creationId xmlns:p14="http://schemas.microsoft.com/office/powerpoint/2010/main" val="1214927596"/>
+        <p14:creationId xmlns:p14="http://schemas.microsoft.com/office/powerpoint/2010/main" val="406113050"/>
       </p:ext>
     </p:extLst>
   </p:cSld>
@@ -5009,7 +5293,7 @@
           <p:cNvPr id="2" name="Title 1">
             <a:extLst>
               <a:ext uri="{FF2B5EF4-FFF2-40B4-BE49-F238E27FC236}">
-                <a16:creationId xmlns:a16="http://schemas.microsoft.com/office/drawing/2014/main" id="{DB72861F-F5E4-489F-9239-8A262FA40823}"/>
+                <a16:creationId xmlns:a16="http://schemas.microsoft.com/office/drawing/2014/main" id="{A3EA70D0-2F6B-413D-8649-F64DA571B742}"/>
               </a:ext>
             </a:extLst>
           </p:cNvPr>
@@ -5027,7 +5311,7 @@
           <a:p>
             <a:r>
               <a:rPr lang="en-US" dirty="0"/>
-              <a:t>Solution: Bridge.NET</a:t>
+              <a:t>Interfacing with JS Ecosystem: Retyped</a:t>
             </a:r>
           </a:p>
         </p:txBody>
@@ -5037,7 +5321,7 @@
           <p:cNvPr id="3" name="Content Placeholder 2">
             <a:extLst>
               <a:ext uri="{FF2B5EF4-FFF2-40B4-BE49-F238E27FC236}">
-                <a16:creationId xmlns:a16="http://schemas.microsoft.com/office/drawing/2014/main" id="{50578B8C-9F1D-430C-BA22-3A4B44FDDFD9}"/>
+                <a16:creationId xmlns:a16="http://schemas.microsoft.com/office/drawing/2014/main" id="{8E432A0F-0A07-4E2C-905E-933D3B164BFB}"/>
               </a:ext>
             </a:extLst>
           </p:cNvPr>
@@ -5054,136 +5338,51 @@
           <a:lstStyle/>
           <a:p>
             <a:pPr>
-              <a:buFont typeface="Arial" panose="020B0604020202020204" pitchFamily="34" charset="0"/>
-              <a:buChar char="•"/>
+              <a:buFont typeface="Wingdings" panose="05000000000000000000" pitchFamily="2" charset="2"/>
+              <a:buChar char="§"/>
             </a:pPr>
-            <a:endParaRPr lang="en-US" dirty="0"/>
-          </a:p>
-        </p:txBody>
-      </p:sp>
-      <p:sp>
-        <p:nvSpPr>
-          <p:cNvPr id="10" name="Text Placeholder 9">
-            <a:extLst>
-              <a:ext uri="{FF2B5EF4-FFF2-40B4-BE49-F238E27FC236}">
-                <a16:creationId xmlns:a16="http://schemas.microsoft.com/office/drawing/2014/main" id="{110E64C6-EB11-4D24-8EA1-9A2F927F9E5F}"/>
-              </a:ext>
-            </a:extLst>
-          </p:cNvPr>
-          <p:cNvSpPr>
-            <a:spLocks noGrp="1"/>
-          </p:cNvSpPr>
-          <p:nvPr>
-            <p:ph type="body" sz="half" idx="2"/>
-          </p:nvPr>
-        </p:nvSpPr>
-        <p:spPr/>
-        <p:txBody>
-          <a:bodyPr>
-            <a:normAutofit/>
-          </a:bodyPr>
-          <a:lstStyle/>
+            <a:r>
+              <a:rPr lang="en-US" dirty="0"/>
+              <a:t> Sister project to </a:t>
+            </a:r>
+            <a:r>
+              <a:rPr lang="en-US" dirty="0" err="1"/>
+              <a:t>Bridge.Net</a:t>
+            </a:r>
+            <a:endParaRPr lang="en-US" dirty="0"/>
+          </a:p>
           <a:p>
             <a:pPr>
-              <a:buFont typeface="Arial" panose="020B0604020202020204" pitchFamily="34" charset="0"/>
-              <a:buChar char="•"/>
+              <a:buFont typeface="Wingdings" panose="05000000000000000000" pitchFamily="2" charset="2"/>
+              <a:buChar char="§"/>
             </a:pPr>
             <a:r>
               <a:rPr lang="en-US" dirty="0"/>
-              <a:t> Common “Validation Engine” written in C#</a:t>
-            </a:r>
-          </a:p>
-          <a:p>
-            <a:pPr>
-              <a:buFont typeface="Arial" panose="020B0604020202020204" pitchFamily="34" charset="0"/>
-              <a:buChar char="•"/>
-            </a:pPr>
-            <a:r>
-              <a:rPr lang="en-US" dirty="0"/>
-              <a:t> </a:t>
+              <a:t> Uses Typescript type definition files (</a:t>
             </a:r>
             <a:r>
               <a:rPr lang="en-US" dirty="0" err="1"/>
-              <a:t>Transpiled</a:t>
-            </a:r>
-            <a:r>
-              <a:rPr lang="en-US" dirty="0"/>
-              <a:t> to </a:t>
+              <a:t>d.ts</a:t>
+            </a:r>
+            <a:r>
+              <a:rPr lang="en-US" dirty="0"/>
+              <a:t>) to create </a:t>
             </a:r>
             <a:r>
               <a:rPr lang="en-US" dirty="0" err="1"/>
-              <a:t>Javascript</a:t>
-            </a:r>
-            <a:r>
-              <a:rPr lang="en-US" dirty="0"/>
-              <a:t> using Bridge</a:t>
-            </a:r>
-          </a:p>
-          <a:p>
-            <a:pPr>
-              <a:buFont typeface="Arial" panose="020B0604020202020204" pitchFamily="34" charset="0"/>
-              <a:buChar char="•"/>
-            </a:pPr>
-            <a:r>
-              <a:rPr lang="en-US" dirty="0"/>
-              <a:t> Runs inside Angular SPA allowing real-time form calculations/validations</a:t>
-            </a:r>
-          </a:p>
-          <a:p>
-            <a:pPr>
-              <a:buFont typeface="Arial" panose="020B0604020202020204" pitchFamily="34" charset="0"/>
-              <a:buChar char="•"/>
-            </a:pPr>
-            <a:r>
-              <a:rPr lang="en-US" dirty="0"/>
-              <a:t> Forms are edited in editor by non-developers with real time preview</a:t>
-            </a:r>
-          </a:p>
-          <a:p>
-            <a:pPr>
-              <a:buFont typeface="Arial" panose="020B0604020202020204" pitchFamily="34" charset="0"/>
-              <a:buChar char="•"/>
-            </a:pPr>
-            <a:r>
-              <a:rPr lang="en-US" dirty="0"/>
-              <a:t> Forms are published as JSON metadata</a:t>
-            </a:r>
-          </a:p>
-        </p:txBody>
-      </p:sp>
-      <p:pic>
-        <p:nvPicPr>
-          <p:cNvPr id="9" name="Content Placeholder 4">
-            <a:extLst>
-              <a:ext uri="{FF2B5EF4-FFF2-40B4-BE49-F238E27FC236}">
-                <a16:creationId xmlns:a16="http://schemas.microsoft.com/office/drawing/2014/main" id="{C70A96D0-6C55-4F79-81F7-C058266A950C}"/>
-              </a:ext>
-            </a:extLst>
-          </p:cNvPr>
-          <p:cNvPicPr>
-            <a:picLocks noGrp="1" noChangeAspect="1"/>
-          </p:cNvPicPr>
-          <p:nvPr>
-            <p:ph sz="half" idx="4294967295"/>
-          </p:nvPr>
-        </p:nvPicPr>
-        <p:blipFill>
-          <a:blip r:embed="rId2"/>
-          <a:stretch>
-            <a:fillRect/>
-          </a:stretch>
-        </p:blipFill>
-        <p:spPr>
-          <a:xfrm>
-            <a:off x="4179531" y="1501400"/>
-            <a:ext cx="8012469" cy="4153087"/>
-          </a:xfrm>
-        </p:spPr>
-      </p:pic>
+              <a:t>Nuget</a:t>
+            </a:r>
+            <a:r>
+              <a:rPr lang="en-US" dirty="0"/>
+              <a:t> packages for interop</a:t>
+            </a:r>
+          </a:p>
+        </p:txBody>
+      </p:sp>
     </p:spTree>
     <p:extLst>
       <p:ext uri="{BB962C8B-B14F-4D97-AF65-F5344CB8AC3E}">
-        <p14:creationId xmlns:p14="http://schemas.microsoft.com/office/powerpoint/2010/main" val="3435262763"/>
+        <p14:creationId xmlns:p14="http://schemas.microsoft.com/office/powerpoint/2010/main" val="2507503047"/>
       </p:ext>
     </p:extLst>
   </p:cSld>
@@ -5215,7 +5414,7 @@
           <p:cNvPr id="2" name="Title 1">
             <a:extLst>
               <a:ext uri="{FF2B5EF4-FFF2-40B4-BE49-F238E27FC236}">
-                <a16:creationId xmlns:a16="http://schemas.microsoft.com/office/drawing/2014/main" id="{6F337665-2FC6-429E-9D06-41B06CB24D1E}"/>
+                <a16:creationId xmlns:a16="http://schemas.microsoft.com/office/drawing/2014/main" id="{A27173B2-A23D-4016-86EF-37740D372BF0}"/>
               </a:ext>
             </a:extLst>
           </p:cNvPr>
@@ -5233,17 +5432,17 @@
           <a:p>
             <a:r>
               <a:rPr lang="en-US" dirty="0"/>
-              <a:t>Gotchas</a:t>
-            </a:r>
-          </a:p>
-        </p:txBody>
-      </p:sp>
-      <p:sp>
-        <p:nvSpPr>
-          <p:cNvPr id="3" name="Content Placeholder 2">
+              <a:t>Gotchas: Performance</a:t>
+            </a:r>
+          </a:p>
+        </p:txBody>
+      </p:sp>
+      <p:sp>
+        <p:nvSpPr>
+          <p:cNvPr id="4" name="Text Placeholder 3">
             <a:extLst>
               <a:ext uri="{FF2B5EF4-FFF2-40B4-BE49-F238E27FC236}">
-                <a16:creationId xmlns:a16="http://schemas.microsoft.com/office/drawing/2014/main" id="{94800AB1-EF7E-4181-B04E-9F8A6B86AD2E}"/>
+                <a16:creationId xmlns:a16="http://schemas.microsoft.com/office/drawing/2014/main" id="{22BC2ACC-7491-4BB4-8583-B670B228D087}"/>
               </a:ext>
             </a:extLst>
           </p:cNvPr>
@@ -5251,7 +5450,35 @@
             <a:spLocks noGrp="1"/>
           </p:cNvSpPr>
           <p:nvPr>
-            <p:ph idx="1"/>
+            <p:ph type="body" idx="1"/>
+          </p:nvPr>
+        </p:nvSpPr>
+        <p:spPr/>
+        <p:txBody>
+          <a:bodyPr/>
+          <a:lstStyle/>
+          <a:p>
+            <a:r>
+              <a:rPr lang="en-US" dirty="0"/>
+              <a:t>Fast</a:t>
+            </a:r>
+          </a:p>
+        </p:txBody>
+      </p:sp>
+      <p:sp>
+        <p:nvSpPr>
+          <p:cNvPr id="5" name="Content Placeholder 4">
+            <a:extLst>
+              <a:ext uri="{FF2B5EF4-FFF2-40B4-BE49-F238E27FC236}">
+                <a16:creationId xmlns:a16="http://schemas.microsoft.com/office/drawing/2014/main" id="{D7153759-8016-460D-96A2-87C14F22EB9F}"/>
+              </a:ext>
+            </a:extLst>
+          </p:cNvPr>
+          <p:cNvSpPr>
+            <a:spLocks noGrp="1"/>
+          </p:cNvSpPr>
+          <p:nvPr>
+            <p:ph sz="half" idx="2"/>
           </p:nvPr>
         </p:nvSpPr>
         <p:spPr/>
@@ -5260,95 +5487,145 @@
           <a:lstStyle/>
           <a:p>
             <a:pPr>
-              <a:buFont typeface="Wingdings" panose="05000000000000000000" pitchFamily="2" charset="2"/>
-              <a:buChar char="§"/>
+              <a:buFont typeface="Arial" panose="020B0604020202020204" pitchFamily="34" charset="0"/>
+              <a:buChar char="•"/>
             </a:pPr>
             <a:r>
               <a:rPr lang="en-US" dirty="0"/>
-              <a:t> Performance </a:t>
-            </a:r>
-          </a:p>
-          <a:p>
-            <a:pPr lvl="1">
-              <a:buFont typeface="Wingdings" panose="05000000000000000000" pitchFamily="2" charset="2"/>
-              <a:buChar char="§"/>
+              <a:t> Simple logic that can be translated directly to </a:t>
+            </a:r>
+            <a:r>
+              <a:rPr lang="en-US" dirty="0" err="1"/>
+              <a:t>Javascript</a:t>
+            </a:r>
+            <a:r>
+              <a:rPr lang="en-US" dirty="0"/>
+              <a:t> (int/float/double math/simple regexes)</a:t>
+            </a:r>
+          </a:p>
+          <a:p>
+            <a:pPr>
+              <a:buFont typeface="Arial" panose="020B0604020202020204" pitchFamily="34" charset="0"/>
+              <a:buChar char="•"/>
             </a:pPr>
             <a:r>
               <a:rPr lang="en-US" dirty="0"/>
-              <a:t>Where code translates closer to 1-1 performance will be better</a:t>
-            </a:r>
-          </a:p>
-          <a:p>
-            <a:pPr lvl="1">
-              <a:buFont typeface="Wingdings" panose="05000000000000000000" pitchFamily="2" charset="2"/>
-              <a:buChar char="§"/>
+              <a:t> </a:t>
+            </a:r>
+            <a:r>
+              <a:rPr lang="en-US" dirty="0" err="1"/>
+              <a:t>Linq</a:t>
+            </a:r>
+            <a:r>
+              <a:rPr lang="en-US" dirty="0"/>
+              <a:t> is generally fairly quick as long as you’re doing </a:t>
+            </a:r>
+            <a:r>
+              <a:rPr lang="en-US"/>
+              <a:t>simple comparisons</a:t>
+            </a:r>
+            <a:endParaRPr lang="en-US" dirty="0"/>
+          </a:p>
+        </p:txBody>
+      </p:sp>
+      <p:sp>
+        <p:nvSpPr>
+          <p:cNvPr id="6" name="Text Placeholder 5">
+            <a:extLst>
+              <a:ext uri="{FF2B5EF4-FFF2-40B4-BE49-F238E27FC236}">
+                <a16:creationId xmlns:a16="http://schemas.microsoft.com/office/drawing/2014/main" id="{5BD239DA-301E-467D-B4CA-5CE1F32F536A}"/>
+              </a:ext>
+            </a:extLst>
+          </p:cNvPr>
+          <p:cNvSpPr>
+            <a:spLocks noGrp="1"/>
+          </p:cNvSpPr>
+          <p:nvPr>
+            <p:ph type="body" sz="quarter" idx="3"/>
+          </p:nvPr>
+        </p:nvSpPr>
+        <p:spPr/>
+        <p:txBody>
+          <a:bodyPr/>
+          <a:lstStyle/>
+          <a:p>
+            <a:r>
+              <a:rPr lang="en-US" dirty="0"/>
+              <a:t>Slow</a:t>
+            </a:r>
+          </a:p>
+        </p:txBody>
+      </p:sp>
+      <p:sp>
+        <p:nvSpPr>
+          <p:cNvPr id="7" name="Content Placeholder 6">
+            <a:extLst>
+              <a:ext uri="{FF2B5EF4-FFF2-40B4-BE49-F238E27FC236}">
+                <a16:creationId xmlns:a16="http://schemas.microsoft.com/office/drawing/2014/main" id="{D8344044-180D-4850-B6F4-C2B6538F62AC}"/>
+              </a:ext>
+            </a:extLst>
+          </p:cNvPr>
+          <p:cNvSpPr>
+            <a:spLocks noGrp="1"/>
+          </p:cNvSpPr>
+          <p:nvPr>
+            <p:ph sz="quarter" idx="4"/>
+          </p:nvPr>
+        </p:nvSpPr>
+        <p:spPr/>
+        <p:txBody>
+          <a:bodyPr/>
+          <a:lstStyle/>
+          <a:p>
+            <a:pPr>
+              <a:buFont typeface="Arial" panose="020B0604020202020204" pitchFamily="34" charset="0"/>
+              <a:buChar char="•"/>
             </a:pPr>
             <a:r>
               <a:rPr lang="en-US" dirty="0"/>
-              <a:t>.NET specific functionality works but can be slow (decimals, extended regex functionality)</a:t>
+              <a:t> </a:t>
+            </a:r>
+            <a:r>
+              <a:rPr lang="en-US" dirty="0" err="1"/>
+              <a:t>.Net</a:t>
+            </a:r>
+            <a:r>
+              <a:rPr lang="en-US" dirty="0"/>
+              <a:t> types that don’t translate to </a:t>
+            </a:r>
+            <a:r>
+              <a:rPr lang="en-US" dirty="0" err="1"/>
+              <a:t>Javascript</a:t>
+            </a:r>
+            <a:r>
+              <a:rPr lang="en-US" dirty="0"/>
+              <a:t> (decimal math)</a:t>
             </a:r>
           </a:p>
           <a:p>
             <a:pPr>
-              <a:buFont typeface="Wingdings" panose="05000000000000000000" pitchFamily="2" charset="2"/>
-              <a:buChar char="§"/>
+              <a:buFont typeface="Arial" panose="020B0604020202020204" pitchFamily="34" charset="0"/>
+              <a:buChar char="•"/>
             </a:pPr>
             <a:r>
               <a:rPr lang="en-US" dirty="0"/>
-              <a:t> Things that seem equivalent aren’t always equivalent (bridge array/</a:t>
+              <a:t> Boxing/unboxing between Bridge and </a:t>
             </a:r>
             <a:r>
               <a:rPr lang="en-US" dirty="0" err="1"/>
-              <a:t>javascript</a:t>
-            </a:r>
-            <a:r>
-              <a:rPr lang="en-US" dirty="0"/>
-              <a:t> array)</a:t>
-            </a:r>
-          </a:p>
-          <a:p>
-            <a:pPr>
-              <a:buFont typeface="Wingdings" panose="05000000000000000000" pitchFamily="2" charset="2"/>
-              <a:buChar char="§"/>
-            </a:pPr>
-            <a:r>
-              <a:rPr lang="en-US" dirty="0"/>
-              <a:t> Reflection</a:t>
-            </a:r>
-          </a:p>
-          <a:p>
-            <a:pPr lvl="1">
-              <a:buFont typeface="Wingdings" panose="05000000000000000000" pitchFamily="2" charset="2"/>
-              <a:buChar char="§"/>
-            </a:pPr>
-            <a:r>
-              <a:rPr lang="en-US" dirty="0"/>
-              <a:t>Enough reflection works that you can be caught off guard when it doesn’t</a:t>
-            </a:r>
-          </a:p>
-          <a:p>
-            <a:pPr>
-              <a:buFont typeface="Wingdings" panose="05000000000000000000" pitchFamily="2" charset="2"/>
-              <a:buChar char="§"/>
-            </a:pPr>
-            <a:r>
-              <a:rPr lang="en-US" dirty="0"/>
-              <a:t> Integration with module bundlers can be a pain because Bridge wasn’t intended to be used this way: </a:t>
-            </a:r>
-            <a:r>
-              <a:rPr lang="en-US" dirty="0">
-                <a:hlinkClick r:id="rId2"/>
-              </a:rPr>
-              <a:t>https://github.com/Azure/monaco-kusto/issues/22</a:t>
-            </a:r>
-            <a:endParaRPr lang="en-US" dirty="0"/>
+              <a:t>Javascript</a:t>
+            </a:r>
+            <a:r>
+              <a:rPr lang="en-US" dirty="0"/>
+              <a:t> Types</a:t>
+            </a:r>
           </a:p>
         </p:txBody>
       </p:sp>
     </p:spTree>
     <p:extLst>
       <p:ext uri="{BB962C8B-B14F-4D97-AF65-F5344CB8AC3E}">
-        <p14:creationId xmlns:p14="http://schemas.microsoft.com/office/powerpoint/2010/main" val="1854439499"/>
+        <p14:creationId xmlns:p14="http://schemas.microsoft.com/office/powerpoint/2010/main" val="1085837101"/>
       </p:ext>
     </p:extLst>
   </p:cSld>
@@ -5380,7 +5657,7 @@
           <p:cNvPr id="2" name="Title 1">
             <a:extLst>
               <a:ext uri="{FF2B5EF4-FFF2-40B4-BE49-F238E27FC236}">
-                <a16:creationId xmlns:a16="http://schemas.microsoft.com/office/drawing/2014/main" id="{A3EA70D0-2F6B-413D-8649-F64DA571B742}"/>
+                <a16:creationId xmlns:a16="http://schemas.microsoft.com/office/drawing/2014/main" id="{6F337665-2FC6-429E-9D06-41B06CB24D1E}"/>
               </a:ext>
             </a:extLst>
           </p:cNvPr>
@@ -5398,7 +5675,7 @@
           <a:p>
             <a:r>
               <a:rPr lang="en-US" dirty="0"/>
-              <a:t>Interfacing with JS Ecosystem: Retyped</a:t>
+              <a:t>Gotchas</a:t>
             </a:r>
           </a:p>
         </p:txBody>
@@ -5408,7 +5685,7 @@
           <p:cNvPr id="3" name="Content Placeholder 2">
             <a:extLst>
               <a:ext uri="{FF2B5EF4-FFF2-40B4-BE49-F238E27FC236}">
-                <a16:creationId xmlns:a16="http://schemas.microsoft.com/office/drawing/2014/main" id="{8E432A0F-0A07-4E2C-905E-933D3B164BFB}"/>
+                <a16:creationId xmlns:a16="http://schemas.microsoft.com/office/drawing/2014/main" id="{94800AB1-EF7E-4181-B04E-9F8A6B86AD2E}"/>
               </a:ext>
             </a:extLst>
           </p:cNvPr>
@@ -5430,13 +5707,28 @@
             </a:pPr>
             <a:r>
               <a:rPr lang="en-US" dirty="0"/>
-              <a:t> Sister project to </a:t>
-            </a:r>
-            <a:r>
-              <a:rPr lang="en-US" dirty="0" err="1"/>
-              <a:t>Bridge.Net</a:t>
-            </a:r>
-            <a:endParaRPr lang="en-US" dirty="0"/>
+              <a:t> Performance </a:t>
+            </a:r>
+          </a:p>
+          <a:p>
+            <a:pPr lvl="1">
+              <a:buFont typeface="Wingdings" panose="05000000000000000000" pitchFamily="2" charset="2"/>
+              <a:buChar char="§"/>
+            </a:pPr>
+            <a:r>
+              <a:rPr lang="en-US" dirty="0"/>
+              <a:t>Where code translates closer to 1-1 performance will be better</a:t>
+            </a:r>
+          </a:p>
+          <a:p>
+            <a:pPr lvl="1">
+              <a:buFont typeface="Wingdings" panose="05000000000000000000" pitchFamily="2" charset="2"/>
+              <a:buChar char="§"/>
+            </a:pPr>
+            <a:r>
+              <a:rPr lang="en-US" dirty="0"/>
+              <a:t>.NET specific functionality works but can be slow (decimals, extended regex functionality)</a:t>
+            </a:r>
           </a:p>
           <a:p>
             <a:pPr>
@@ -5445,31 +5737,93 @@
             </a:pPr>
             <a:r>
               <a:rPr lang="en-US" dirty="0"/>
-              <a:t> Uses Typescript type definition files (</a:t>
+              <a:t> Need all source code to </a:t>
             </a:r>
             <a:r>
               <a:rPr lang="en-US" dirty="0" err="1"/>
-              <a:t>d.ts</a:t>
-            </a:r>
-            <a:r>
-              <a:rPr lang="en-US" dirty="0"/>
-              <a:t>) to create </a:t>
+              <a:t>transpile</a:t>
+            </a:r>
+            <a:endParaRPr lang="en-US" dirty="0"/>
+          </a:p>
+          <a:p>
+            <a:pPr lvl="1">
+              <a:buFont typeface="Wingdings" panose="05000000000000000000" pitchFamily="2" charset="2"/>
+              <a:buChar char="§"/>
+            </a:pPr>
+            <a:r>
+              <a:rPr lang="en-US" dirty="0"/>
+              <a:t>You likely won’t be </a:t>
             </a:r>
             <a:r>
               <a:rPr lang="en-US" dirty="0" err="1"/>
-              <a:t>Nuget</a:t>
-            </a:r>
-            <a:r>
-              <a:rPr lang="en-US" dirty="0"/>
-              <a:t> packages for interop</a:t>
-            </a:r>
+              <a:t>transpiling</a:t>
+            </a:r>
+            <a:r>
+              <a:rPr lang="en-US" dirty="0"/>
+              <a:t> significant .NET libraries</a:t>
+            </a:r>
+          </a:p>
+          <a:p>
+            <a:pPr>
+              <a:buFont typeface="Wingdings" panose="05000000000000000000" pitchFamily="2" charset="2"/>
+              <a:buChar char="§"/>
+            </a:pPr>
+            <a:r>
+              <a:rPr lang="en-US" dirty="0"/>
+              <a:t> Things that seem equivalent aren’t always equivalent (bridge array/</a:t>
+            </a:r>
+            <a:r>
+              <a:rPr lang="en-US" dirty="0" err="1"/>
+              <a:t>javascript</a:t>
+            </a:r>
+            <a:r>
+              <a:rPr lang="en-US" dirty="0"/>
+              <a:t> array)</a:t>
+            </a:r>
+          </a:p>
+          <a:p>
+            <a:pPr>
+              <a:buFont typeface="Wingdings" panose="05000000000000000000" pitchFamily="2" charset="2"/>
+              <a:buChar char="§"/>
+            </a:pPr>
+            <a:r>
+              <a:rPr lang="en-US" dirty="0"/>
+              <a:t> Reflection</a:t>
+            </a:r>
+          </a:p>
+          <a:p>
+            <a:pPr lvl="1">
+              <a:buFont typeface="Wingdings" panose="05000000000000000000" pitchFamily="2" charset="2"/>
+              <a:buChar char="§"/>
+            </a:pPr>
+            <a:r>
+              <a:rPr lang="en-US" dirty="0"/>
+              <a:t>Enough reflection works that you can be caught off guard when it doesn’t</a:t>
+            </a:r>
+          </a:p>
+          <a:p>
+            <a:pPr>
+              <a:buFont typeface="Wingdings" panose="05000000000000000000" pitchFamily="2" charset="2"/>
+              <a:buChar char="§"/>
+            </a:pPr>
+            <a:r>
+              <a:rPr lang="en-US" dirty="0"/>
+              <a:t> Integration with module bundlers can be a pain because Bridge wasn’t intended to be used this way: </a:t>
+            </a:r>
+            <a:r>
+              <a:rPr lang="en-US" dirty="0">
+                <a:hlinkClick r:id="rId2"/>
+              </a:rPr>
+              <a:t>https://github.com/Azure/monaco-kusto/issues/22</a:t>
+            </a:r>
+            <a:endParaRPr lang="en-US" dirty="0"/>
           </a:p>
         </p:txBody>
       </p:sp>
     </p:spTree>
     <p:extLst>
       <p:ext uri="{BB962C8B-B14F-4D97-AF65-F5344CB8AC3E}">
-        <p14:creationId xmlns:p14="http://schemas.microsoft.com/office/powerpoint/2010/main" val="2507503047"/>
+        <p14:creationId xmlns:p14="http://schemas.microsoft.com/office/powerpoint/2010/main" val="1854439499"/>
       </p:ext>
     </p:extLst>
   </p:cSld>
@@ -5501,7 +5855,7 @@
           <p:cNvPr id="2" name="Title 1">
             <a:extLst>
               <a:ext uri="{FF2B5EF4-FFF2-40B4-BE49-F238E27FC236}">
-                <a16:creationId xmlns:a16="http://schemas.microsoft.com/office/drawing/2014/main" id="{3828297B-80B3-4E2C-AFCF-A02F37BCFD87}"/>
+                <a16:creationId xmlns:a16="http://schemas.microsoft.com/office/drawing/2014/main" id="{7091D0E5-1C16-4903-A1E6-83EECDE50ABB}"/>
               </a:ext>
             </a:extLst>
           </p:cNvPr>
@@ -5519,15 +5873,7 @@
           <a:p>
             <a:r>
               <a:rPr lang="en-US" dirty="0"/>
-              <a:t>Use Case: </a:t>
-            </a:r>
-            <a:r>
-              <a:rPr lang="en-US" dirty="0" err="1"/>
-              <a:t>Transpiling</a:t>
-            </a:r>
-            <a:r>
-              <a:rPr lang="en-US" dirty="0"/>
-              <a:t> Business Logic</a:t>
+              <a:t>Still not convinced? A Case Study.</a:t>
             </a:r>
           </a:p>
         </p:txBody>
@@ -5537,7 +5883,7 @@
           <p:cNvPr id="3" name="Content Placeholder 2">
             <a:extLst>
               <a:ext uri="{FF2B5EF4-FFF2-40B4-BE49-F238E27FC236}">
-                <a16:creationId xmlns:a16="http://schemas.microsoft.com/office/drawing/2014/main" id="{DE03C8C4-2337-4316-B021-1D5AFB73488A}"/>
+                <a16:creationId xmlns:a16="http://schemas.microsoft.com/office/drawing/2014/main" id="{A0E2B1B0-9E13-49C4-885C-6ABE1A6580AE}"/>
               </a:ext>
             </a:extLst>
           </p:cNvPr>
@@ -5554,38 +5900,68 @@
           <a:lstStyle/>
           <a:p>
             <a:pPr>
-              <a:buFont typeface="Arial" panose="020B0604020202020204" pitchFamily="34" charset="0"/>
-              <a:buChar char="•"/>
+              <a:buFont typeface="Wingdings" panose="05000000000000000000" pitchFamily="2" charset="2"/>
+              <a:buChar char="§"/>
             </a:pPr>
             <a:r>
               <a:rPr lang="en-US" dirty="0"/>
-              <a:t> PRO: Business logic is equivalent without any extra work</a:t>
+              <a:t> </a:t>
+            </a:r>
+            <a:r>
+              <a:rPr lang="en-US" dirty="0" err="1"/>
+              <a:t>Greatland</a:t>
+            </a:r>
+            <a:r>
+              <a:rPr lang="en-US" dirty="0"/>
+              <a:t> Corp: Business tax filing service (1099/w-2)</a:t>
             </a:r>
           </a:p>
           <a:p>
             <a:pPr>
-              <a:buFont typeface="Arial" panose="020B0604020202020204" pitchFamily="34" charset="0"/>
-              <a:buChar char="•"/>
+              <a:buFont typeface="Wingdings" panose="05000000000000000000" pitchFamily="2" charset="2"/>
+              <a:buChar char="§"/>
             </a:pPr>
             <a:r>
               <a:rPr lang="en-US" dirty="0"/>
-              <a:t> CON: Interop between </a:t>
+              <a:t> Traditionally a </a:t>
             </a:r>
             <a:r>
               <a:rPr lang="en-US" dirty="0" err="1"/>
-              <a:t>Javascript</a:t>
-            </a:r>
-            <a:r>
-              <a:rPr lang="en-US" dirty="0"/>
-              <a:t> and </a:t>
-            </a:r>
-            <a:r>
-              <a:rPr lang="en-US" dirty="0" err="1"/>
-              <a:t>transpiled</a:t>
-            </a:r>
-            <a:r>
-              <a:rPr lang="en-US" dirty="0"/>
-              <a:t> code can be nasty, especially with generics</a:t>
+              <a:t>.Net</a:t>
+            </a:r>
+            <a:r>
+              <a:rPr lang="en-US" dirty="0"/>
+              <a:t> shop</a:t>
+            </a:r>
+          </a:p>
+          <a:p>
+            <a:pPr>
+              <a:buFont typeface="Wingdings" panose="05000000000000000000" pitchFamily="2" charset="2"/>
+              <a:buChar char="§"/>
+            </a:pPr>
+            <a:r>
+              <a:rPr lang="en-US" dirty="0"/>
+              <a:t> Complicated business logic for form rules</a:t>
+            </a:r>
+          </a:p>
+          <a:p>
+            <a:pPr lvl="1">
+              <a:buFont typeface="Wingdings" panose="05000000000000000000" pitchFamily="2" charset="2"/>
+              <a:buChar char="§"/>
+            </a:pPr>
+            <a:r>
+              <a:rPr lang="en-US" dirty="0"/>
+              <a:t> Immediate validation on client side preferred</a:t>
+            </a:r>
+          </a:p>
+          <a:p>
+            <a:pPr lvl="1">
+              <a:buFont typeface="Wingdings" panose="05000000000000000000" pitchFamily="2" charset="2"/>
+              <a:buChar char="§"/>
+            </a:pPr>
+            <a:r>
+              <a:rPr lang="en-US" dirty="0"/>
+              <a:t> Had issues in the past duplicating client and server side validations</a:t>
             </a:r>
           </a:p>
         </p:txBody>
@@ -5593,7 +5969,7 @@
     </p:spTree>
     <p:extLst>
       <p:ext uri="{BB962C8B-B14F-4D97-AF65-F5344CB8AC3E}">
-        <p14:creationId xmlns:p14="http://schemas.microsoft.com/office/powerpoint/2010/main" val="3936768775"/>
+        <p14:creationId xmlns:p14="http://schemas.microsoft.com/office/powerpoint/2010/main" val="1214927596"/>
       </p:ext>
     </p:extLst>
   </p:cSld>
@@ -5625,7 +6001,7 @@
           <p:cNvPr id="2" name="Title 1">
             <a:extLst>
               <a:ext uri="{FF2B5EF4-FFF2-40B4-BE49-F238E27FC236}">
-                <a16:creationId xmlns:a16="http://schemas.microsoft.com/office/drawing/2014/main" id="{4AD4C152-7495-4980-B3A3-5DB6A3FB6705}"/>
+                <a16:creationId xmlns:a16="http://schemas.microsoft.com/office/drawing/2014/main" id="{DB72861F-F5E4-489F-9239-8A262FA40823}"/>
               </a:ext>
             </a:extLst>
           </p:cNvPr>
@@ -5633,27 +6009,27 @@
             <a:spLocks noGrp="1"/>
           </p:cNvSpPr>
           <p:nvPr>
-            <p:ph type="ctrTitle"/>
-          </p:nvPr>
-        </p:nvSpPr>
-        <p:spPr/>
-        <p:txBody>
-          <a:bodyPr/>
-          <a:lstStyle/>
-          <a:p>
-            <a:r>
-              <a:rPr lang="en-US" dirty="0"/>
-              <a:t>DEMO</a:t>
-            </a:r>
-          </a:p>
-        </p:txBody>
-      </p:sp>
-      <p:sp>
-        <p:nvSpPr>
-          <p:cNvPr id="5" name="Subtitle 4">
+            <p:ph type="title"/>
+          </p:nvPr>
+        </p:nvSpPr>
+        <p:spPr/>
+        <p:txBody>
+          <a:bodyPr/>
+          <a:lstStyle/>
+          <a:p>
+            <a:r>
+              <a:rPr lang="en-US" dirty="0"/>
+              <a:t>Solution: Bridge.NET</a:t>
+            </a:r>
+          </a:p>
+        </p:txBody>
+      </p:sp>
+      <p:sp>
+        <p:nvSpPr>
+          <p:cNvPr id="3" name="Content Placeholder 2">
             <a:extLst>
               <a:ext uri="{FF2B5EF4-FFF2-40B4-BE49-F238E27FC236}">
-                <a16:creationId xmlns:a16="http://schemas.microsoft.com/office/drawing/2014/main" id="{E8D2EE01-206B-4B8F-97F0-3DE8D92389FE}"/>
+                <a16:creationId xmlns:a16="http://schemas.microsoft.com/office/drawing/2014/main" id="{50578B8C-9F1D-430C-BA22-3A4B44FDDFD9}"/>
               </a:ext>
             </a:extLst>
           </p:cNvPr>
@@ -5661,33 +6037,145 @@
             <a:spLocks noGrp="1"/>
           </p:cNvSpPr>
           <p:nvPr>
-            <p:ph type="subTitle" idx="1"/>
-          </p:nvPr>
-        </p:nvSpPr>
-        <p:spPr/>
-        <p:txBody>
-          <a:bodyPr/>
-          <a:lstStyle/>
-          <a:p>
-            <a:r>
-              <a:rPr lang="en-US" dirty="0"/>
-              <a:t>Angular spa with </a:t>
+            <p:ph idx="1"/>
+          </p:nvPr>
+        </p:nvSpPr>
+        <p:spPr/>
+        <p:txBody>
+          <a:bodyPr/>
+          <a:lstStyle/>
+          <a:p>
+            <a:pPr>
+              <a:buFont typeface="Arial" panose="020B0604020202020204" pitchFamily="34" charset="0"/>
+              <a:buChar char="•"/>
+            </a:pPr>
+            <a:endParaRPr lang="en-US" dirty="0"/>
+          </a:p>
+        </p:txBody>
+      </p:sp>
+      <p:sp>
+        <p:nvSpPr>
+          <p:cNvPr id="10" name="Text Placeholder 9">
+            <a:extLst>
+              <a:ext uri="{FF2B5EF4-FFF2-40B4-BE49-F238E27FC236}">
+                <a16:creationId xmlns:a16="http://schemas.microsoft.com/office/drawing/2014/main" id="{110E64C6-EB11-4D24-8EA1-9A2F927F9E5F}"/>
+              </a:ext>
+            </a:extLst>
+          </p:cNvPr>
+          <p:cNvSpPr>
+            <a:spLocks noGrp="1"/>
+          </p:cNvSpPr>
+          <p:nvPr>
+            <p:ph type="body" sz="half" idx="2"/>
+          </p:nvPr>
+        </p:nvSpPr>
+        <p:spPr/>
+        <p:txBody>
+          <a:bodyPr>
+            <a:normAutofit/>
+          </a:bodyPr>
+          <a:lstStyle/>
+          <a:p>
+            <a:pPr>
+              <a:buFont typeface="Arial" panose="020B0604020202020204" pitchFamily="34" charset="0"/>
+              <a:buChar char="•"/>
+            </a:pPr>
+            <a:r>
+              <a:rPr lang="en-US" dirty="0"/>
+              <a:t> Common “Validation Engine” written in C#</a:t>
+            </a:r>
+          </a:p>
+          <a:p>
+            <a:pPr>
+              <a:buFont typeface="Arial" panose="020B0604020202020204" pitchFamily="34" charset="0"/>
+              <a:buChar char="•"/>
+            </a:pPr>
+            <a:r>
+              <a:rPr lang="en-US" dirty="0"/>
+              <a:t> </a:t>
             </a:r>
             <a:r>
               <a:rPr lang="en-US" dirty="0" err="1"/>
-              <a:t>transpiled</a:t>
-            </a:r>
-            <a:r>
-              <a:rPr lang="en-US" dirty="0"/>
-              <a:t> business logic</a:t>
-            </a:r>
-          </a:p>
-        </p:txBody>
-      </p:sp>
+              <a:t>Transpiled</a:t>
+            </a:r>
+            <a:r>
+              <a:rPr lang="en-US" dirty="0"/>
+              <a:t> to </a:t>
+            </a:r>
+            <a:r>
+              <a:rPr lang="en-US" dirty="0" err="1"/>
+              <a:t>Javascript</a:t>
+            </a:r>
+            <a:r>
+              <a:rPr lang="en-US" dirty="0"/>
+              <a:t> using Bridge</a:t>
+            </a:r>
+          </a:p>
+          <a:p>
+            <a:pPr>
+              <a:buFont typeface="Arial" panose="020B0604020202020204" pitchFamily="34" charset="0"/>
+              <a:buChar char="•"/>
+            </a:pPr>
+            <a:r>
+              <a:rPr lang="en-US" dirty="0"/>
+              <a:t> Runs inside Angular SPA allowing real-time form calculations/validations</a:t>
+            </a:r>
+          </a:p>
+          <a:p>
+            <a:pPr>
+              <a:buFont typeface="Arial" panose="020B0604020202020204" pitchFamily="34" charset="0"/>
+              <a:buChar char="•"/>
+            </a:pPr>
+            <a:r>
+              <a:rPr lang="en-US" dirty="0"/>
+              <a:t> Forms are edited in editor by non-developers with real time preview</a:t>
+            </a:r>
+          </a:p>
+          <a:p>
+            <a:pPr>
+              <a:buFont typeface="Arial" panose="020B0604020202020204" pitchFamily="34" charset="0"/>
+              <a:buChar char="•"/>
+            </a:pPr>
+            <a:r>
+              <a:rPr lang="en-US" dirty="0"/>
+              <a:t> Forms are published as JSON metadata</a:t>
+            </a:r>
+          </a:p>
+        </p:txBody>
+      </p:sp>
+      <p:pic>
+        <p:nvPicPr>
+          <p:cNvPr id="9" name="Content Placeholder 4">
+            <a:extLst>
+              <a:ext uri="{FF2B5EF4-FFF2-40B4-BE49-F238E27FC236}">
+                <a16:creationId xmlns:a16="http://schemas.microsoft.com/office/drawing/2014/main" id="{C70A96D0-6C55-4F79-81F7-C058266A950C}"/>
+              </a:ext>
+            </a:extLst>
+          </p:cNvPr>
+          <p:cNvPicPr>
+            <a:picLocks noGrp="1" noChangeAspect="1"/>
+          </p:cNvPicPr>
+          <p:nvPr>
+            <p:ph sz="half" idx="4294967295"/>
+          </p:nvPr>
+        </p:nvPicPr>
+        <p:blipFill>
+          <a:blip r:embed="rId2"/>
+          <a:stretch>
+            <a:fillRect/>
+          </a:stretch>
+        </p:blipFill>
+        <p:spPr>
+          <a:xfrm>
+            <a:off x="4179531" y="1501400"/>
+            <a:ext cx="8012469" cy="4153087"/>
+          </a:xfrm>
+        </p:spPr>
+      </p:pic>
     </p:spTree>
     <p:extLst>
       <p:ext uri="{BB962C8B-B14F-4D97-AF65-F5344CB8AC3E}">
-        <p14:creationId xmlns:p14="http://schemas.microsoft.com/office/powerpoint/2010/main" val="3122916019"/>
+        <p14:creationId xmlns:p14="http://schemas.microsoft.com/office/powerpoint/2010/main" val="3435262763"/>
       </p:ext>
     </p:extLst>
   </p:cSld>

</xml_diff>

<commit_message>
add demo start files
</commit_message>
<xml_diff>
--- a/bridge.net/bridge-net.pptx
+++ b/bridge.net/bridge-net.pptx
@@ -355,7 +355,7 @@
           <a:p>
             <a:fld id="{96DFF08F-DC6B-4601-B491-B0F83F6DD2DA}" type="datetimeFigureOut">
               <a:rPr lang="en-US" dirty="0"/>
-              <a:t>5/10/2019</a:t>
+              <a:t>5/11/2019</a:t>
             </a:fld>
             <a:endParaRPr lang="en-US" dirty="0"/>
           </a:p>
@@ -558,7 +558,7 @@
           <a:p>
             <a:fld id="{96DFF08F-DC6B-4601-B491-B0F83F6DD2DA}" type="datetimeFigureOut">
               <a:rPr lang="en-US" dirty="0"/>
-              <a:t>5/10/2019</a:t>
+              <a:t>5/11/2019</a:t>
             </a:fld>
             <a:endParaRPr lang="en-US" dirty="0"/>
           </a:p>
@@ -809,7 +809,7 @@
           <a:p>
             <a:fld id="{96DFF08F-DC6B-4601-B491-B0F83F6DD2DA}" type="datetimeFigureOut">
               <a:rPr lang="en-US" dirty="0"/>
-              <a:t>5/10/2019</a:t>
+              <a:t>5/11/2019</a:t>
             </a:fld>
             <a:endParaRPr lang="en-US" dirty="0"/>
           </a:p>
@@ -974,7 +974,7 @@
           <a:p>
             <a:fld id="{D62CEF3B-A037-46D0-B02C-1428F07E9383}" type="datetimeFigureOut">
               <a:rPr lang="en-US" dirty="0"/>
-              <a:t>5/10/2019</a:t>
+              <a:t>5/11/2019</a:t>
             </a:fld>
             <a:endParaRPr lang="en-US" dirty="0"/>
           </a:p>
@@ -1312,7 +1312,7 @@
           <a:p>
             <a:fld id="{96DFF08F-DC6B-4601-B491-B0F83F6DD2DA}" type="datetimeFigureOut">
               <a:rPr lang="en-US" dirty="0"/>
-              <a:t>5/10/2019</a:t>
+              <a:t>5/11/2019</a:t>
             </a:fld>
             <a:endParaRPr lang="en-US" dirty="0"/>
           </a:p>
@@ -1582,7 +1582,7 @@
           <a:p>
             <a:fld id="{96DFF08F-DC6B-4601-B491-B0F83F6DD2DA}" type="datetimeFigureOut">
               <a:rPr lang="en-US" dirty="0"/>
-              <a:t>5/10/2019</a:t>
+              <a:t>5/11/2019</a:t>
             </a:fld>
             <a:endParaRPr lang="en-US" dirty="0"/>
           </a:p>
@@ -1956,7 +1956,7 @@
           <a:p>
             <a:fld id="{96DFF08F-DC6B-4601-B491-B0F83F6DD2DA}" type="datetimeFigureOut">
               <a:rPr lang="en-US" dirty="0"/>
-              <a:t>5/10/2019</a:t>
+              <a:t>5/11/2019</a:t>
             </a:fld>
             <a:endParaRPr lang="en-US" dirty="0"/>
           </a:p>
@@ -2069,7 +2069,7 @@
           <a:p>
             <a:fld id="{96DFF08F-DC6B-4601-B491-B0F83F6DD2DA}" type="datetimeFigureOut">
               <a:rPr lang="en-US" dirty="0"/>
-              <a:t>5/10/2019</a:t>
+              <a:t>5/11/2019</a:t>
             </a:fld>
             <a:endParaRPr lang="en-US" dirty="0"/>
           </a:p>
@@ -2236,7 +2236,7 @@
             <a:fld id="{96DFF08F-DC6B-4601-B491-B0F83F6DD2DA}" type="datetimeFigureOut">
               <a:rPr lang="en-US" dirty="0"/>
               <a:pPr/>
-              <a:t>5/10/2019</a:t>
+              <a:t>5/11/2019</a:t>
             </a:fld>
             <a:endParaRPr lang="en-US" dirty="0"/>
           </a:p>
@@ -2587,7 +2587,7 @@
             <a:fld id="{96DFF08F-DC6B-4601-B491-B0F83F6DD2DA}" type="datetimeFigureOut">
               <a:rPr lang="en-US" dirty="0"/>
               <a:pPr/>
-              <a:t>5/10/2019</a:t>
+              <a:t>5/11/2019</a:t>
             </a:fld>
             <a:endParaRPr lang="en-US" dirty="0"/>
           </a:p>
@@ -2960,7 +2960,7 @@
           <a:p>
             <a:fld id="{96DFF08F-DC6B-4601-B491-B0F83F6DD2DA}" type="datetimeFigureOut">
               <a:rPr lang="en-US" dirty="0"/>
-              <a:t>5/10/2019</a:t>
+              <a:t>5/11/2019</a:t>
             </a:fld>
             <a:endParaRPr lang="en-US" dirty="0"/>
           </a:p>
@@ -3243,7 +3243,7 @@
             <a:fld id="{96DFF08F-DC6B-4601-B491-B0F83F6DD2DA}" type="datetimeFigureOut">
               <a:rPr lang="en-US" dirty="0"/>
               <a:pPr/>
-              <a:t>5/10/2019</a:t>
+              <a:t>5/11/2019</a:t>
             </a:fld>
             <a:endParaRPr lang="en-US" dirty="0"/>
           </a:p>
@@ -9380,8 +9380,17 @@
             </a:r>
             <a:r>
               <a:rPr lang="en-US" dirty="0"/>
-              <a:t> Types</a:t>
-            </a:r>
+              <a:t> Types (</a:t>
+            </a:r>
+            <a:r>
+              <a:rPr lang="en-US" dirty="0" err="1"/>
+              <a:t>Nullables</a:t>
+            </a:r>
+            <a:r>
+              <a:rPr lang="en-US"/>
+              <a:t> especially)</a:t>
+            </a:r>
+            <a:endParaRPr lang="en-US" dirty="0"/>
           </a:p>
         </p:txBody>
       </p:sp>

</xml_diff>